<commit_message>
More info added: unions, enumerations, macros.
</commit_message>
<xml_diff>
--- a/images/embedded_c.pptx
+++ b/images/embedded_c.pptx
@@ -34,6 +34,7 @@
     <p:sldId id="282" r:id="rId28"/>
     <p:sldId id="283" r:id="rId29"/>
     <p:sldId id="284" r:id="rId30"/>
+    <p:sldId id="285" r:id="rId31"/>
   </p:sldIdLst>
   <p:sldSz cx="12192000" cy="6858000"/>
   <p:notesSz cx="6858000" cy="9144000"/>
@@ -303,7 +304,7 @@
           <a:p>
             <a:fld id="{BAA714DD-4824-4BA3-8596-555CC1C8F2D9}" type="datetimeFigureOut">
               <a:rPr lang="en-US" smtClean="0"/>
-              <a:t>2018-12-15</a:t>
+              <a:t>3/29/2019</a:t>
             </a:fld>
             <a:endParaRPr lang="en-US"/>
           </a:p>
@@ -357,7 +358,7 @@
           <a:p>
             <a:fld id="{1A5D1BC2-D3D0-46BF-AA06-5462A3C5CA0C}" type="slidenum">
               <a:rPr lang="en-US" smtClean="0"/>
-              <a:t>‹#›</a:t>
+              <a:t>‹Nr.›</a:t>
             </a:fld>
             <a:endParaRPr lang="en-US"/>
           </a:p>
@@ -501,7 +502,7 @@
           <a:p>
             <a:fld id="{BAA714DD-4824-4BA3-8596-555CC1C8F2D9}" type="datetimeFigureOut">
               <a:rPr lang="en-US" smtClean="0"/>
-              <a:t>2018-12-15</a:t>
+              <a:t>3/29/2019</a:t>
             </a:fld>
             <a:endParaRPr lang="en-US"/>
           </a:p>
@@ -555,7 +556,7 @@
           <a:p>
             <a:fld id="{1A5D1BC2-D3D0-46BF-AA06-5462A3C5CA0C}" type="slidenum">
               <a:rPr lang="en-US" smtClean="0"/>
-              <a:t>‹#›</a:t>
+              <a:t>‹Nr.›</a:t>
             </a:fld>
             <a:endParaRPr lang="en-US"/>
           </a:p>
@@ -709,7 +710,7 @@
           <a:p>
             <a:fld id="{BAA714DD-4824-4BA3-8596-555CC1C8F2D9}" type="datetimeFigureOut">
               <a:rPr lang="en-US" smtClean="0"/>
-              <a:t>2018-12-15</a:t>
+              <a:t>3/29/2019</a:t>
             </a:fld>
             <a:endParaRPr lang="en-US"/>
           </a:p>
@@ -763,7 +764,7 @@
           <a:p>
             <a:fld id="{1A5D1BC2-D3D0-46BF-AA06-5462A3C5CA0C}" type="slidenum">
               <a:rPr lang="en-US" smtClean="0"/>
-              <a:t>‹#›</a:t>
+              <a:t>‹Nr.›</a:t>
             </a:fld>
             <a:endParaRPr lang="en-US"/>
           </a:p>
@@ -907,7 +908,7 @@
           <a:p>
             <a:fld id="{BAA714DD-4824-4BA3-8596-555CC1C8F2D9}" type="datetimeFigureOut">
               <a:rPr lang="en-US" smtClean="0"/>
-              <a:t>2018-12-15</a:t>
+              <a:t>3/29/2019</a:t>
             </a:fld>
             <a:endParaRPr lang="en-US"/>
           </a:p>
@@ -961,7 +962,7 @@
           <a:p>
             <a:fld id="{1A5D1BC2-D3D0-46BF-AA06-5462A3C5CA0C}" type="slidenum">
               <a:rPr lang="en-US" smtClean="0"/>
-              <a:t>‹#›</a:t>
+              <a:t>‹Nr.›</a:t>
             </a:fld>
             <a:endParaRPr lang="en-US"/>
           </a:p>
@@ -1182,7 +1183,7 @@
           <a:p>
             <a:fld id="{BAA714DD-4824-4BA3-8596-555CC1C8F2D9}" type="datetimeFigureOut">
               <a:rPr lang="en-US" smtClean="0"/>
-              <a:t>2018-12-15</a:t>
+              <a:t>3/29/2019</a:t>
             </a:fld>
             <a:endParaRPr lang="en-US"/>
           </a:p>
@@ -1236,7 +1237,7 @@
           <a:p>
             <a:fld id="{1A5D1BC2-D3D0-46BF-AA06-5462A3C5CA0C}" type="slidenum">
               <a:rPr lang="en-US" smtClean="0"/>
-              <a:t>‹#›</a:t>
+              <a:t>‹Nr.›</a:t>
             </a:fld>
             <a:endParaRPr lang="en-US"/>
           </a:p>
@@ -1447,7 +1448,7 @@
           <a:p>
             <a:fld id="{BAA714DD-4824-4BA3-8596-555CC1C8F2D9}" type="datetimeFigureOut">
               <a:rPr lang="en-US" smtClean="0"/>
-              <a:t>2018-12-15</a:t>
+              <a:t>3/29/2019</a:t>
             </a:fld>
             <a:endParaRPr lang="en-US"/>
           </a:p>
@@ -1501,7 +1502,7 @@
           <a:p>
             <a:fld id="{1A5D1BC2-D3D0-46BF-AA06-5462A3C5CA0C}" type="slidenum">
               <a:rPr lang="en-US" smtClean="0"/>
-              <a:t>‹#›</a:t>
+              <a:t>‹Nr.›</a:t>
             </a:fld>
             <a:endParaRPr lang="en-US"/>
           </a:p>
@@ -1859,7 +1860,7 @@
           <a:p>
             <a:fld id="{BAA714DD-4824-4BA3-8596-555CC1C8F2D9}" type="datetimeFigureOut">
               <a:rPr lang="en-US" smtClean="0"/>
-              <a:t>2018-12-15</a:t>
+              <a:t>3/29/2019</a:t>
             </a:fld>
             <a:endParaRPr lang="en-US"/>
           </a:p>
@@ -1913,7 +1914,7 @@
           <a:p>
             <a:fld id="{1A5D1BC2-D3D0-46BF-AA06-5462A3C5CA0C}" type="slidenum">
               <a:rPr lang="en-US" smtClean="0"/>
-              <a:t>‹#›</a:t>
+              <a:t>‹Nr.›</a:t>
             </a:fld>
             <a:endParaRPr lang="en-US"/>
           </a:p>
@@ -2000,7 +2001,7 @@
           <a:p>
             <a:fld id="{BAA714DD-4824-4BA3-8596-555CC1C8F2D9}" type="datetimeFigureOut">
               <a:rPr lang="en-US" smtClean="0"/>
-              <a:t>2018-12-15</a:t>
+              <a:t>3/29/2019</a:t>
             </a:fld>
             <a:endParaRPr lang="en-US"/>
           </a:p>
@@ -2054,7 +2055,7 @@
           <a:p>
             <a:fld id="{1A5D1BC2-D3D0-46BF-AA06-5462A3C5CA0C}" type="slidenum">
               <a:rPr lang="en-US" smtClean="0"/>
-              <a:t>‹#›</a:t>
+              <a:t>‹Nr.›</a:t>
             </a:fld>
             <a:endParaRPr lang="en-US"/>
           </a:p>
@@ -2113,7 +2114,7 @@
           <a:p>
             <a:fld id="{BAA714DD-4824-4BA3-8596-555CC1C8F2D9}" type="datetimeFigureOut">
               <a:rPr lang="en-US" smtClean="0"/>
-              <a:t>2018-12-15</a:t>
+              <a:t>3/29/2019</a:t>
             </a:fld>
             <a:endParaRPr lang="en-US"/>
           </a:p>
@@ -2167,7 +2168,7 @@
           <a:p>
             <a:fld id="{1A5D1BC2-D3D0-46BF-AA06-5462A3C5CA0C}" type="slidenum">
               <a:rPr lang="en-US" smtClean="0"/>
-              <a:t>‹#›</a:t>
+              <a:t>‹Nr.›</a:t>
             </a:fld>
             <a:endParaRPr lang="en-US"/>
           </a:p>
@@ -2424,7 +2425,7 @@
           <a:p>
             <a:fld id="{BAA714DD-4824-4BA3-8596-555CC1C8F2D9}" type="datetimeFigureOut">
               <a:rPr lang="en-US" smtClean="0"/>
-              <a:t>2018-12-15</a:t>
+              <a:t>3/29/2019</a:t>
             </a:fld>
             <a:endParaRPr lang="en-US"/>
           </a:p>
@@ -2478,7 +2479,7 @@
           <a:p>
             <a:fld id="{1A5D1BC2-D3D0-46BF-AA06-5462A3C5CA0C}" type="slidenum">
               <a:rPr lang="en-US" smtClean="0"/>
-              <a:t>‹#›</a:t>
+              <a:t>‹Nr.›</a:t>
             </a:fld>
             <a:endParaRPr lang="en-US"/>
           </a:p>
@@ -2712,7 +2713,7 @@
           <a:p>
             <a:fld id="{BAA714DD-4824-4BA3-8596-555CC1C8F2D9}" type="datetimeFigureOut">
               <a:rPr lang="en-US" smtClean="0"/>
-              <a:t>2018-12-15</a:t>
+              <a:t>3/29/2019</a:t>
             </a:fld>
             <a:endParaRPr lang="en-US"/>
           </a:p>
@@ -2766,7 +2767,7 @@
           <a:p>
             <a:fld id="{1A5D1BC2-D3D0-46BF-AA06-5462A3C5CA0C}" type="slidenum">
               <a:rPr lang="en-US" smtClean="0"/>
-              <a:t>‹#›</a:t>
+              <a:t>‹Nr.›</a:t>
             </a:fld>
             <a:endParaRPr lang="en-US"/>
           </a:p>
@@ -2953,7 +2954,7 @@
           <a:p>
             <a:fld id="{BAA714DD-4824-4BA3-8596-555CC1C8F2D9}" type="datetimeFigureOut">
               <a:rPr lang="en-US" smtClean="0"/>
-              <a:t>2018-12-15</a:t>
+              <a:t>3/29/2019</a:t>
             </a:fld>
             <a:endParaRPr lang="en-US"/>
           </a:p>
@@ -3043,7 +3044,7 @@
           <a:p>
             <a:fld id="{1A5D1BC2-D3D0-46BF-AA06-5462A3C5CA0C}" type="slidenum">
               <a:rPr lang="en-US" smtClean="0"/>
-              <a:t>‹#›</a:t>
+              <a:t>‹Nr.›</a:t>
             </a:fld>
             <a:endParaRPr lang="en-US"/>
           </a:p>
@@ -25301,6 +25302,601 @@
 </p:sld>
 </file>
 
+<file path=ppt/slides/slide30.xml><?xml version="1.0" encoding="utf-8"?>
+<p:sld xmlns:a="http://schemas.openxmlformats.org/drawingml/2006/main" xmlns:r="http://schemas.openxmlformats.org/officeDocument/2006/relationships" xmlns:p="http://schemas.openxmlformats.org/presentationml/2006/main">
+  <p:cSld>
+    <p:spTree>
+      <p:nvGrpSpPr>
+        <p:cNvPr id="1" name=""/>
+        <p:cNvGrpSpPr/>
+        <p:nvPr/>
+      </p:nvGrpSpPr>
+      <p:grpSpPr>
+        <a:xfrm>
+          <a:off x="0" y="0"/>
+          <a:ext cx="0" cy="0"/>
+          <a:chOff x="0" y="0"/>
+          <a:chExt cx="0" cy="0"/>
+        </a:xfrm>
+      </p:grpSpPr>
+      <p:sp>
+        <p:nvSpPr>
+          <p:cNvPr id="2" name="Rectangle 1">
+            <a:extLst>
+              <a:ext uri="{FF2B5EF4-FFF2-40B4-BE49-F238E27FC236}">
+                <a16:creationId xmlns:a16="http://schemas.microsoft.com/office/drawing/2014/main" id="{A4C694C5-1240-4E92-8C22-8193B03C45D8}"/>
+              </a:ext>
+            </a:extLst>
+          </p:cNvPr>
+          <p:cNvSpPr/>
+          <p:nvPr/>
+        </p:nvSpPr>
+        <p:spPr>
+          <a:xfrm>
+            <a:off x="2431143" y="1969543"/>
+            <a:ext cx="1800000" cy="360000"/>
+          </a:xfrm>
+          <a:prstGeom prst="rect">
+            <a:avLst/>
+          </a:prstGeom>
+          <a:solidFill>
+            <a:schemeClr val="bg1"/>
+          </a:solidFill>
+          <a:ln>
+            <a:solidFill>
+              <a:schemeClr val="tx1"/>
+            </a:solidFill>
+          </a:ln>
+        </p:spPr>
+        <p:style>
+          <a:lnRef idx="2">
+            <a:schemeClr val="accent1">
+              <a:shade val="50000"/>
+            </a:schemeClr>
+          </a:lnRef>
+          <a:fillRef idx="1">
+            <a:schemeClr val="accent1"/>
+          </a:fillRef>
+          <a:effectRef idx="0">
+            <a:schemeClr val="accent1"/>
+          </a:effectRef>
+          <a:fontRef idx="minor">
+            <a:schemeClr val="lt1"/>
+          </a:fontRef>
+        </p:style>
+        <p:txBody>
+          <a:bodyPr rtlCol="0" anchor="ctr"/>
+          <a:lstStyle/>
+          <a:p>
+            <a:pPr algn="ctr"/>
+            <a:r>
+              <a:rPr lang="en-US" b="1" dirty="0">
+                <a:solidFill>
+                  <a:schemeClr val="tx1"/>
+                </a:solidFill>
+                <a:latin typeface="Courier New" panose="02070309020205020404" pitchFamily="49" charset="0"/>
+                <a:cs typeface="Courier New" panose="02070309020205020404" pitchFamily="49" charset="0"/>
+              </a:rPr>
+              <a:t>0000 00FF</a:t>
+            </a:r>
+          </a:p>
+        </p:txBody>
+      </p:sp>
+      <p:sp>
+        <p:nvSpPr>
+          <p:cNvPr id="11" name="TextBox 10">
+            <a:extLst>
+              <a:ext uri="{FF2B5EF4-FFF2-40B4-BE49-F238E27FC236}">
+                <a16:creationId xmlns:a16="http://schemas.microsoft.com/office/drawing/2014/main" id="{A532657C-110F-4C2B-A852-7A2AFC986AD7}"/>
+              </a:ext>
+            </a:extLst>
+          </p:cNvPr>
+          <p:cNvSpPr txBox="1"/>
+          <p:nvPr/>
+        </p:nvSpPr>
+        <p:spPr>
+          <a:xfrm>
+            <a:off x="4231143" y="1969543"/>
+            <a:ext cx="1800000" cy="369332"/>
+          </a:xfrm>
+          <a:prstGeom prst="rect">
+            <a:avLst/>
+          </a:prstGeom>
+          <a:noFill/>
+        </p:spPr>
+        <p:txBody>
+          <a:bodyPr wrap="square" rtlCol="0">
+            <a:spAutoFit/>
+          </a:bodyPr>
+          <a:lstStyle/>
+          <a:p>
+            <a:r>
+              <a:rPr lang="en-US" b="1" dirty="0">
+                <a:latin typeface="Courier New" panose="02070309020205020404" pitchFamily="49" charset="0"/>
+                <a:cs typeface="Courier New" panose="02070309020205020404" pitchFamily="49" charset="0"/>
+              </a:rPr>
+              <a:t>0x20000000</a:t>
+            </a:r>
+          </a:p>
+        </p:txBody>
+      </p:sp>
+      <p:sp>
+        <p:nvSpPr>
+          <p:cNvPr id="16" name="TextBox 15">
+            <a:extLst>
+              <a:ext uri="{FF2B5EF4-FFF2-40B4-BE49-F238E27FC236}">
+                <a16:creationId xmlns:a16="http://schemas.microsoft.com/office/drawing/2014/main" id="{984E7926-A9EE-408F-9DA2-859371B200B8}"/>
+              </a:ext>
+            </a:extLst>
+          </p:cNvPr>
+          <p:cNvSpPr txBox="1"/>
+          <p:nvPr/>
+        </p:nvSpPr>
+        <p:spPr>
+          <a:xfrm>
+            <a:off x="2431143" y="1593505"/>
+            <a:ext cx="1800000" cy="369332"/>
+          </a:xfrm>
+          <a:prstGeom prst="rect">
+            <a:avLst/>
+          </a:prstGeom>
+          <a:noFill/>
+        </p:spPr>
+        <p:txBody>
+          <a:bodyPr wrap="square" rtlCol="0">
+            <a:spAutoFit/>
+          </a:bodyPr>
+          <a:lstStyle/>
+          <a:p>
+            <a:pPr algn="r"/>
+            <a:r>
+              <a:rPr lang="en-US" dirty="0"/>
+              <a:t>Variable at</a:t>
+            </a:r>
+          </a:p>
+        </p:txBody>
+      </p:sp>
+      <p:sp>
+        <p:nvSpPr>
+          <p:cNvPr id="17" name="TextBox 16">
+            <a:extLst>
+              <a:ext uri="{FF2B5EF4-FFF2-40B4-BE49-F238E27FC236}">
+                <a16:creationId xmlns:a16="http://schemas.microsoft.com/office/drawing/2014/main" id="{80A5D7E0-A33B-456C-8DE2-D190F4C7E247}"/>
+              </a:ext>
+            </a:extLst>
+          </p:cNvPr>
+          <p:cNvSpPr txBox="1"/>
+          <p:nvPr/>
+        </p:nvSpPr>
+        <p:spPr>
+          <a:xfrm>
+            <a:off x="4231143" y="1584173"/>
+            <a:ext cx="1800000" cy="369332"/>
+          </a:xfrm>
+          <a:prstGeom prst="rect">
+            <a:avLst/>
+          </a:prstGeom>
+          <a:noFill/>
+        </p:spPr>
+        <p:txBody>
+          <a:bodyPr wrap="square" rtlCol="0">
+            <a:spAutoFit/>
+          </a:bodyPr>
+          <a:lstStyle/>
+          <a:p>
+            <a:r>
+              <a:rPr lang="en-US" dirty="0"/>
+              <a:t>Address</a:t>
+            </a:r>
+          </a:p>
+        </p:txBody>
+      </p:sp>
+      <p:sp>
+        <p:nvSpPr>
+          <p:cNvPr id="22" name="TextBox 21">
+            <a:extLst>
+              <a:ext uri="{FF2B5EF4-FFF2-40B4-BE49-F238E27FC236}">
+                <a16:creationId xmlns:a16="http://schemas.microsoft.com/office/drawing/2014/main" id="{3E59C0B7-8662-49EB-8D7E-CA07D7201933}"/>
+              </a:ext>
+            </a:extLst>
+          </p:cNvPr>
+          <p:cNvSpPr txBox="1"/>
+          <p:nvPr/>
+        </p:nvSpPr>
+        <p:spPr>
+          <a:xfrm>
+            <a:off x="413657" y="1954401"/>
+            <a:ext cx="2017486" cy="369332"/>
+          </a:xfrm>
+          <a:prstGeom prst="rect">
+            <a:avLst/>
+          </a:prstGeom>
+          <a:noFill/>
+        </p:spPr>
+        <p:txBody>
+          <a:bodyPr wrap="square" rtlCol="0">
+            <a:spAutoFit/>
+          </a:bodyPr>
+          <a:lstStyle/>
+          <a:p>
+            <a:pPr algn="r"/>
+            <a:r>
+              <a:rPr lang="en-US" dirty="0"/>
+              <a:t>Union </a:t>
+            </a:r>
+            <a:r>
+              <a:rPr lang="en-US" dirty="0" err="1">
+                <a:latin typeface="Courier New" panose="02070309020205020404" pitchFamily="49" charset="0"/>
+                <a:cs typeface="Courier New" panose="02070309020205020404" pitchFamily="49" charset="0"/>
+              </a:rPr>
+              <a:t>univar</a:t>
+            </a:r>
+            <a:endParaRPr lang="en-US" dirty="0">
+              <a:latin typeface="Courier New" panose="02070309020205020404" pitchFamily="49" charset="0"/>
+              <a:cs typeface="Courier New" panose="02070309020205020404" pitchFamily="49" charset="0"/>
+            </a:endParaRPr>
+          </a:p>
+        </p:txBody>
+      </p:sp>
+      <p:sp>
+        <p:nvSpPr>
+          <p:cNvPr id="3" name="Rectangle 2">
+            <a:extLst>
+              <a:ext uri="{FF2B5EF4-FFF2-40B4-BE49-F238E27FC236}">
+                <a16:creationId xmlns:a16="http://schemas.microsoft.com/office/drawing/2014/main" id="{19843B8A-2929-431A-A5B1-E1BDF5B4DA85}"/>
+              </a:ext>
+            </a:extLst>
+          </p:cNvPr>
+          <p:cNvSpPr/>
+          <p:nvPr/>
+        </p:nvSpPr>
+        <p:spPr>
+          <a:xfrm>
+            <a:off x="6364514" y="1954401"/>
+            <a:ext cx="3897086" cy="369332"/>
+          </a:xfrm>
+          <a:prstGeom prst="rect">
+            <a:avLst/>
+          </a:prstGeom>
+        </p:spPr>
+        <p:txBody>
+          <a:bodyPr wrap="square">
+            <a:spAutoFit/>
+          </a:bodyPr>
+          <a:lstStyle/>
+          <a:p>
+            <a:r>
+              <a:rPr lang="de-DE" b="1" dirty="0" err="1">
+                <a:latin typeface="Courier New" panose="02070309020205020404" pitchFamily="49" charset="0"/>
+                <a:cs typeface="Courier New" panose="02070309020205020404" pitchFamily="49" charset="0"/>
+              </a:rPr>
+              <a:t>univar.m</a:t>
+            </a:r>
+            <a:r>
+              <a:rPr lang="de-DE" b="1" dirty="0">
+                <a:latin typeface="Courier New" panose="02070309020205020404" pitchFamily="49" charset="0"/>
+                <a:cs typeface="Courier New" panose="02070309020205020404" pitchFamily="49" charset="0"/>
+              </a:rPr>
+              <a:t> = 0xFF;</a:t>
+            </a:r>
+            <a:endParaRPr lang="pt-BR" b="1" dirty="0">
+              <a:latin typeface="Courier New" panose="02070309020205020404" pitchFamily="49" charset="0"/>
+              <a:cs typeface="Courier New" panose="02070309020205020404" pitchFamily="49" charset="0"/>
+            </a:endParaRPr>
+          </a:p>
+        </p:txBody>
+      </p:sp>
+      <p:sp>
+        <p:nvSpPr>
+          <p:cNvPr id="25" name="Rectangle 1">
+            <a:extLst>
+              <a:ext uri="{FF2B5EF4-FFF2-40B4-BE49-F238E27FC236}">
+                <a16:creationId xmlns:a16="http://schemas.microsoft.com/office/drawing/2014/main" id="{15A93AC3-1626-49B3-948D-96133AF725E8}"/>
+              </a:ext>
+            </a:extLst>
+          </p:cNvPr>
+          <p:cNvSpPr/>
+          <p:nvPr/>
+        </p:nvSpPr>
+        <p:spPr>
+          <a:xfrm>
+            <a:off x="2431143" y="2801452"/>
+            <a:ext cx="1800000" cy="360000"/>
+          </a:xfrm>
+          <a:prstGeom prst="rect">
+            <a:avLst/>
+          </a:prstGeom>
+          <a:solidFill>
+            <a:schemeClr val="bg1"/>
+          </a:solidFill>
+          <a:ln>
+            <a:solidFill>
+              <a:schemeClr val="tx1"/>
+            </a:solidFill>
+          </a:ln>
+        </p:spPr>
+        <p:style>
+          <a:lnRef idx="2">
+            <a:schemeClr val="accent1">
+              <a:shade val="50000"/>
+            </a:schemeClr>
+          </a:lnRef>
+          <a:fillRef idx="1">
+            <a:schemeClr val="accent1"/>
+          </a:fillRef>
+          <a:effectRef idx="0">
+            <a:schemeClr val="accent1"/>
+          </a:effectRef>
+          <a:fontRef idx="minor">
+            <a:schemeClr val="lt1"/>
+          </a:fontRef>
+        </p:style>
+        <p:txBody>
+          <a:bodyPr rtlCol="0" anchor="ctr"/>
+          <a:lstStyle/>
+          <a:p>
+            <a:pPr algn="ctr"/>
+            <a:r>
+              <a:rPr lang="en-US" b="1" dirty="0">
+                <a:solidFill>
+                  <a:schemeClr val="tx1"/>
+                </a:solidFill>
+                <a:latin typeface="Courier New" panose="02070309020205020404" pitchFamily="49" charset="0"/>
+                <a:cs typeface="Courier New" panose="02070309020205020404" pitchFamily="49" charset="0"/>
+              </a:rPr>
+              <a:t>0000 FFFF</a:t>
+            </a:r>
+          </a:p>
+        </p:txBody>
+      </p:sp>
+      <p:sp>
+        <p:nvSpPr>
+          <p:cNvPr id="26" name="TextBox 10">
+            <a:extLst>
+              <a:ext uri="{FF2B5EF4-FFF2-40B4-BE49-F238E27FC236}">
+                <a16:creationId xmlns:a16="http://schemas.microsoft.com/office/drawing/2014/main" id="{297676A2-1E7E-4C39-9A71-EA95392098BA}"/>
+              </a:ext>
+            </a:extLst>
+          </p:cNvPr>
+          <p:cNvSpPr txBox="1"/>
+          <p:nvPr/>
+        </p:nvSpPr>
+        <p:spPr>
+          <a:xfrm>
+            <a:off x="4231143" y="2801452"/>
+            <a:ext cx="1800000" cy="369332"/>
+          </a:xfrm>
+          <a:prstGeom prst="rect">
+            <a:avLst/>
+          </a:prstGeom>
+          <a:noFill/>
+        </p:spPr>
+        <p:txBody>
+          <a:bodyPr wrap="square" rtlCol="0">
+            <a:spAutoFit/>
+          </a:bodyPr>
+          <a:lstStyle/>
+          <a:p>
+            <a:r>
+              <a:rPr lang="en-US" b="1" dirty="0">
+                <a:latin typeface="Courier New" panose="02070309020205020404" pitchFamily="49" charset="0"/>
+                <a:cs typeface="Courier New" panose="02070309020205020404" pitchFamily="49" charset="0"/>
+              </a:rPr>
+              <a:t>0x20000000</a:t>
+            </a:r>
+          </a:p>
+        </p:txBody>
+      </p:sp>
+      <p:sp>
+        <p:nvSpPr>
+          <p:cNvPr id="27" name="Rectangle 2">
+            <a:extLst>
+              <a:ext uri="{FF2B5EF4-FFF2-40B4-BE49-F238E27FC236}">
+                <a16:creationId xmlns:a16="http://schemas.microsoft.com/office/drawing/2014/main" id="{8E7B1AB4-DCC9-48ED-B653-19AD353F77E0}"/>
+              </a:ext>
+            </a:extLst>
+          </p:cNvPr>
+          <p:cNvSpPr/>
+          <p:nvPr/>
+        </p:nvSpPr>
+        <p:spPr>
+          <a:xfrm>
+            <a:off x="6364514" y="2786310"/>
+            <a:ext cx="3897086" cy="369332"/>
+          </a:xfrm>
+          <a:prstGeom prst="rect">
+            <a:avLst/>
+          </a:prstGeom>
+        </p:spPr>
+        <p:txBody>
+          <a:bodyPr wrap="square">
+            <a:spAutoFit/>
+          </a:bodyPr>
+          <a:lstStyle/>
+          <a:p>
+            <a:r>
+              <a:rPr lang="de-DE" b="1" dirty="0" err="1">
+                <a:latin typeface="Courier New" panose="02070309020205020404" pitchFamily="49" charset="0"/>
+                <a:cs typeface="Courier New" panose="02070309020205020404" pitchFamily="49" charset="0"/>
+              </a:rPr>
+              <a:t>univar.n</a:t>
+            </a:r>
+            <a:r>
+              <a:rPr lang="de-DE" b="1" dirty="0">
+                <a:latin typeface="Courier New" panose="02070309020205020404" pitchFamily="49" charset="0"/>
+                <a:cs typeface="Courier New" panose="02070309020205020404" pitchFamily="49" charset="0"/>
+              </a:rPr>
+              <a:t> = 0xFFFF;</a:t>
+            </a:r>
+            <a:endParaRPr lang="pt-BR" b="1" dirty="0">
+              <a:latin typeface="Courier New" panose="02070309020205020404" pitchFamily="49" charset="0"/>
+              <a:cs typeface="Courier New" panose="02070309020205020404" pitchFamily="49" charset="0"/>
+            </a:endParaRPr>
+          </a:p>
+        </p:txBody>
+      </p:sp>
+      <p:sp>
+        <p:nvSpPr>
+          <p:cNvPr id="28" name="Rectangle 1">
+            <a:extLst>
+              <a:ext uri="{FF2B5EF4-FFF2-40B4-BE49-F238E27FC236}">
+                <a16:creationId xmlns:a16="http://schemas.microsoft.com/office/drawing/2014/main" id="{88FCFECA-70A3-4A54-B76E-2E0F32970FD7}"/>
+              </a:ext>
+            </a:extLst>
+          </p:cNvPr>
+          <p:cNvSpPr/>
+          <p:nvPr/>
+        </p:nvSpPr>
+        <p:spPr>
+          <a:xfrm>
+            <a:off x="2431143" y="3653964"/>
+            <a:ext cx="1800000" cy="360000"/>
+          </a:xfrm>
+          <a:prstGeom prst="rect">
+            <a:avLst/>
+          </a:prstGeom>
+          <a:solidFill>
+            <a:schemeClr val="bg1"/>
+          </a:solidFill>
+          <a:ln>
+            <a:solidFill>
+              <a:schemeClr val="tx1"/>
+            </a:solidFill>
+          </a:ln>
+        </p:spPr>
+        <p:style>
+          <a:lnRef idx="2">
+            <a:schemeClr val="accent1">
+              <a:shade val="50000"/>
+            </a:schemeClr>
+          </a:lnRef>
+          <a:fillRef idx="1">
+            <a:schemeClr val="accent1"/>
+          </a:fillRef>
+          <a:effectRef idx="0">
+            <a:schemeClr val="accent1"/>
+          </a:effectRef>
+          <a:fontRef idx="minor">
+            <a:schemeClr val="lt1"/>
+          </a:fontRef>
+        </p:style>
+        <p:txBody>
+          <a:bodyPr rtlCol="0" anchor="ctr"/>
+          <a:lstStyle/>
+          <a:p>
+            <a:pPr algn="ctr"/>
+            <a:r>
+              <a:rPr lang="en-US" b="1" dirty="0">
+                <a:solidFill>
+                  <a:schemeClr val="tx1"/>
+                </a:solidFill>
+                <a:latin typeface="Courier New" panose="02070309020205020404" pitchFamily="49" charset="0"/>
+                <a:cs typeface="Courier New" panose="02070309020205020404" pitchFamily="49" charset="0"/>
+              </a:rPr>
+              <a:t>FFFF FFFF</a:t>
+            </a:r>
+          </a:p>
+        </p:txBody>
+      </p:sp>
+      <p:sp>
+        <p:nvSpPr>
+          <p:cNvPr id="29" name="TextBox 10">
+            <a:extLst>
+              <a:ext uri="{FF2B5EF4-FFF2-40B4-BE49-F238E27FC236}">
+                <a16:creationId xmlns:a16="http://schemas.microsoft.com/office/drawing/2014/main" id="{9560D115-9666-4B65-A13E-0845AC615E3E}"/>
+              </a:ext>
+            </a:extLst>
+          </p:cNvPr>
+          <p:cNvSpPr txBox="1"/>
+          <p:nvPr/>
+        </p:nvSpPr>
+        <p:spPr>
+          <a:xfrm>
+            <a:off x="4231143" y="3653964"/>
+            <a:ext cx="1800000" cy="369332"/>
+          </a:xfrm>
+          <a:prstGeom prst="rect">
+            <a:avLst/>
+          </a:prstGeom>
+          <a:noFill/>
+        </p:spPr>
+        <p:txBody>
+          <a:bodyPr wrap="square" rtlCol="0">
+            <a:spAutoFit/>
+          </a:bodyPr>
+          <a:lstStyle/>
+          <a:p>
+            <a:r>
+              <a:rPr lang="en-US" b="1" dirty="0">
+                <a:latin typeface="Courier New" panose="02070309020205020404" pitchFamily="49" charset="0"/>
+                <a:cs typeface="Courier New" panose="02070309020205020404" pitchFamily="49" charset="0"/>
+              </a:rPr>
+              <a:t>0x20000000</a:t>
+            </a:r>
+          </a:p>
+        </p:txBody>
+      </p:sp>
+      <p:sp>
+        <p:nvSpPr>
+          <p:cNvPr id="30" name="Rectangle 2">
+            <a:extLst>
+              <a:ext uri="{FF2B5EF4-FFF2-40B4-BE49-F238E27FC236}">
+                <a16:creationId xmlns:a16="http://schemas.microsoft.com/office/drawing/2014/main" id="{855629E6-0545-4BEB-9317-90BD7F0E3D5F}"/>
+              </a:ext>
+            </a:extLst>
+          </p:cNvPr>
+          <p:cNvSpPr/>
+          <p:nvPr/>
+        </p:nvSpPr>
+        <p:spPr>
+          <a:xfrm>
+            <a:off x="6364514" y="3638822"/>
+            <a:ext cx="3897086" cy="369332"/>
+          </a:xfrm>
+          <a:prstGeom prst="rect">
+            <a:avLst/>
+          </a:prstGeom>
+        </p:spPr>
+        <p:txBody>
+          <a:bodyPr wrap="square">
+            <a:spAutoFit/>
+          </a:bodyPr>
+          <a:lstStyle/>
+          <a:p>
+            <a:r>
+              <a:rPr lang="de-DE" b="1" dirty="0" err="1">
+                <a:latin typeface="Courier New" panose="02070309020205020404" pitchFamily="49" charset="0"/>
+                <a:cs typeface="Courier New" panose="02070309020205020404" pitchFamily="49" charset="0"/>
+              </a:rPr>
+              <a:t>univar.l</a:t>
+            </a:r>
+            <a:r>
+              <a:rPr lang="de-DE" b="1" dirty="0">
+                <a:latin typeface="Courier New" panose="02070309020205020404" pitchFamily="49" charset="0"/>
+                <a:cs typeface="Courier New" panose="02070309020205020404" pitchFamily="49" charset="0"/>
+              </a:rPr>
+              <a:t> = 0xFFFFFFFF;</a:t>
+            </a:r>
+            <a:endParaRPr lang="pt-BR" b="1" dirty="0">
+              <a:latin typeface="Courier New" panose="02070309020205020404" pitchFamily="49" charset="0"/>
+              <a:cs typeface="Courier New" panose="02070309020205020404" pitchFamily="49" charset="0"/>
+            </a:endParaRPr>
+          </a:p>
+        </p:txBody>
+      </p:sp>
+    </p:spTree>
+    <p:extLst>
+      <p:ext uri="{BB962C8B-B14F-4D97-AF65-F5344CB8AC3E}">
+        <p14:creationId xmlns:p14="http://schemas.microsoft.com/office/powerpoint/2010/main" val="2404588523"/>
+      </p:ext>
+    </p:extLst>
+  </p:cSld>
+  <p:clrMapOvr>
+    <a:masterClrMapping/>
+  </p:clrMapOvr>
+</p:sld>
+</file>
+
 <file path=ppt/slides/slide4.xml><?xml version="1.0" encoding="utf-8"?>
 <p:sld xmlns:a="http://schemas.openxmlformats.org/drawingml/2006/main" xmlns:r="http://schemas.openxmlformats.org/officeDocument/2006/relationships" xmlns:p="http://schemas.openxmlformats.org/presentationml/2006/main">
   <p:cSld>

</xml_diff>